<commit_message>
Inclusão e atualização de informações
</commit_message>
<xml_diff>
--- a/ALVF_AnalisePropostas_TI_DiretoriaExecutiva_Fev_2025/ALVF_BackOffice.pptx
+++ b/ALVF_AnalisePropostas_TI_DiretoriaExecutiva_Fev_2025/ALVF_BackOffice.pptx
@@ -4944,13 +4944,10 @@
           </a:bodyPr>
           <a:lstStyle/>
           <a:p>
-            <a:r>
-              <a:rPr lang="en-US" sz="4500" b="1" dirty="0" err="1"/>
-              <a:t>Modelo</a:t>
-            </a:r>
+            <a:pPr algn="ctr"/>
             <a:r>
               <a:rPr lang="en-US" sz="4500" b="1" dirty="0"/>
-              <a:t> de Back Office Questor</a:t>
+              <a:t>Back Office Questor</a:t>
             </a:r>
             <a:br>
               <a:rPr lang="en-US" sz="4500" b="1" dirty="0"/>
@@ -5217,13 +5214,10 @@
           </a:bodyPr>
           <a:lstStyle/>
           <a:p>
-            <a:r>
-              <a:rPr lang="en-US" sz="4500" b="1" dirty="0" err="1"/>
-              <a:t>Modelo</a:t>
-            </a:r>
+            <a:pPr algn="ctr"/>
             <a:r>
               <a:rPr lang="en-US" sz="4500" b="1" dirty="0"/>
-              <a:t> de Back Office </a:t>
+              <a:t>Back Office </a:t>
             </a:r>
             <a:r>
               <a:rPr lang="en-US" sz="4500" b="1" dirty="0" err="1"/>

</xml_diff>